<commit_message>
arreglado una cosa de la cookie, aunque no entre dentro de la entrega, nos acabamos de dar cuenta
</commit_message>
<xml_diff>
--- a/rol_desarrolladores/presentacion.pptx
+++ b/rol_desarrolladores/presentacion.pptx
@@ -130,6 +130,11 @@
       </a:defRPr>
     </a:lvl9pPr>
   </p:defaultTextStyle>
+  <p:extLst>
+    <p:ext uri="{EFAFB233-063F-42B5-8137-9DF3F51BA10A}">
+      <p15:sldGuideLst xmlns:p15="http://schemas.microsoft.com/office/powerpoint/2012/main"/>
+    </p:ext>
+  </p:extLst>
 </p:presentation>
 </file>
 
@@ -8897,7 +8902,7 @@
         </p:nvSpPr>
         <p:spPr>
           <a:xfrm>
-            <a:off x="1066800" y="1517260"/>
+            <a:off x="1066800" y="1490627"/>
             <a:ext cx="10058400" cy="4023360"/>
           </a:xfrm>
         </p:spPr>
@@ -10093,7 +10098,7 @@
         </p:nvSpPr>
         <p:spPr>
           <a:xfrm>
-            <a:off x="7859485" y="2198914"/>
+            <a:off x="7830094" y="1772786"/>
             <a:ext cx="3690257" cy="3670180"/>
           </a:xfrm>
         </p:spPr>

</xml_diff>